<commit_message>
Update typo in tabular data (51 to 66 %)
</commit_message>
<xml_diff>
--- a/plots/results_in_a_nutshell.pptx
+++ b/plots/results_in_a_nutshell.pptx
@@ -115,7 +115,7 @@
 <file path=ppt/charts/chart1.xml><?xml version="1.0" encoding="utf-8"?>
 <c:chartSpace xmlns:c="http://schemas.openxmlformats.org/drawingml/2006/chart" xmlns:a="http://schemas.openxmlformats.org/drawingml/2006/main" xmlns:r="http://schemas.openxmlformats.org/officeDocument/2006/relationships" xmlns:c16r2="http://schemas.microsoft.com/office/drawing/2015/06/chart">
   <c:date1904 val="0"/>
-  <c:lang val="de-DE"/>
+  <c:lang val="en-US"/>
   <c:roundedCorners val="0"/>
   <mc:AlternateContent xmlns:mc="http://schemas.openxmlformats.org/markup-compatibility/2006">
     <mc:Choice xmlns:c14="http://schemas.microsoft.com/office/drawing/2007/8/2/chart" Requires="c14">
@@ -333,7 +333,7 @@
 <file path=ppt/charts/chart2.xml><?xml version="1.0" encoding="utf-8"?>
 <c:chartSpace xmlns:c="http://schemas.openxmlformats.org/drawingml/2006/chart" xmlns:a="http://schemas.openxmlformats.org/drawingml/2006/main" xmlns:r="http://schemas.openxmlformats.org/officeDocument/2006/relationships" xmlns:c16r2="http://schemas.microsoft.com/office/drawing/2015/06/chart">
   <c:date1904 val="0"/>
-  <c:lang val="de-DE"/>
+  <c:lang val="en-US"/>
   <c:roundedCorners val="0"/>
   <mc:AlternateContent xmlns:mc="http://schemas.openxmlformats.org/markup-compatibility/2006">
     <mc:Choice xmlns:c14="http://schemas.microsoft.com/office/drawing/2007/8/2/chart" Requires="c14">
@@ -491,8 +491,8 @@
               <c:idx val="1"/>
               <c:layout>
                 <c:manualLayout>
-                  <c:x val="4.3441571543871786E-2"/>
-                  <c:y val="0.32777526368921223"/>
+                  <c:x val="1.1409690995042085E-2"/>
+                  <c:y val="0.34658772346276651"/>
                 </c:manualLayout>
               </c:layout>
               <c:showLegendKey val="0"/>
@@ -626,16 +626,16 @@
             <c:numRef>
               <c:f>Tabelle1!$B$2:$B$5</c:f>
               <c:numCache>
-                <c:formatCode>0%</c:formatCode>
+                <c:formatCode>0.0%</c:formatCode>
                 <c:ptCount val="4"/>
                 <c:pt idx="0">
-                  <c:v>0.51</c:v>
+                  <c:v>0.65762004175365341</c:v>
                 </c:pt>
                 <c:pt idx="1">
-                  <c:v>0.32</c:v>
+                  <c:v>0.31524008350730687</c:v>
                 </c:pt>
                 <c:pt idx="2">
-                  <c:v>0.03</c:v>
+                  <c:v>2.7139874739039668E-2</c:v>
                 </c:pt>
                 <c:pt idx="3">
                   <c:v>0</c:v>
@@ -646,6 +646,184 @@
           <c:extLst>
             <c:ext xmlns:c16="http://schemas.microsoft.com/office/drawing/2014/chart" uri="{C3380CC4-5D6E-409C-BE32-E72D297353CC}">
               <c16:uniqueId val="{00000004-1705-43B7-A19E-3650EE392C9D}"/>
+            </c:ext>
+          </c:extLst>
+        </c:ser>
+        <c:ser>
+          <c:idx val="1"/>
+          <c:order val="1"/>
+          <c:tx>
+            <c:strRef>
+              <c:f>Tabelle1!$C$1</c:f>
+              <c:strCache>
+                <c:ptCount val="1"/>
+                <c:pt idx="0">
+                  <c:v>Column1</c:v>
+                </c:pt>
+              </c:strCache>
+            </c:strRef>
+          </c:tx>
+          <c:dPt>
+            <c:idx val="0"/>
+            <c:bubble3D val="0"/>
+            <c:spPr>
+              <a:solidFill>
+                <a:schemeClr val="accent1"/>
+              </a:solidFill>
+              <a:ln w="19050">
+                <a:solidFill>
+                  <a:schemeClr val="lt1"/>
+                </a:solidFill>
+              </a:ln>
+              <a:effectLst/>
+            </c:spPr>
+          </c:dPt>
+          <c:dPt>
+            <c:idx val="1"/>
+            <c:bubble3D val="0"/>
+            <c:spPr>
+              <a:solidFill>
+                <a:schemeClr val="accent3"/>
+              </a:solidFill>
+              <a:ln w="19050">
+                <a:solidFill>
+                  <a:schemeClr val="lt1"/>
+                </a:solidFill>
+              </a:ln>
+              <a:effectLst/>
+            </c:spPr>
+          </c:dPt>
+          <c:dPt>
+            <c:idx val="2"/>
+            <c:bubble3D val="0"/>
+            <c:spPr>
+              <a:solidFill>
+                <a:schemeClr val="accent5"/>
+              </a:solidFill>
+              <a:ln w="19050">
+                <a:solidFill>
+                  <a:schemeClr val="lt1"/>
+                </a:solidFill>
+              </a:ln>
+              <a:effectLst/>
+            </c:spPr>
+          </c:dPt>
+          <c:dPt>
+            <c:idx val="3"/>
+            <c:bubble3D val="0"/>
+            <c:spPr>
+              <a:solidFill>
+                <a:schemeClr val="accent1">
+                  <a:lumMod val="60000"/>
+                </a:schemeClr>
+              </a:solidFill>
+              <a:ln w="19050">
+                <a:solidFill>
+                  <a:schemeClr val="lt1"/>
+                </a:solidFill>
+              </a:ln>
+              <a:effectLst/>
+            </c:spPr>
+          </c:dPt>
+          <c:dLbls>
+            <c:spPr>
+              <a:noFill/>
+              <a:ln>
+                <a:noFill/>
+              </a:ln>
+              <a:effectLst/>
+            </c:spPr>
+            <c:txPr>
+              <a:bodyPr rot="0" spcFirstLastPara="1" vertOverflow="ellipsis" vert="horz" wrap="square" lIns="38100" tIns="19050" rIns="38100" bIns="19050" anchor="ctr" anchorCtr="1">
+                <a:spAutoFit/>
+              </a:bodyPr>
+              <a:lstStyle/>
+              <a:p>
+                <a:pPr>
+                  <a:defRPr sz="900" b="0" i="0" u="none" strike="noStrike" kern="1200" baseline="0">
+                    <a:solidFill>
+                      <a:schemeClr val="tx1">
+                        <a:lumMod val="75000"/>
+                        <a:lumOff val="25000"/>
+                      </a:schemeClr>
+                    </a:solidFill>
+                    <a:latin typeface="CMU Serif" panose="02000603000000000000" pitchFamily="2" charset="0"/>
+                    <a:ea typeface="CMU Serif" panose="02000603000000000000" pitchFamily="2" charset="0"/>
+                    <a:cs typeface="CMU Serif" panose="02000603000000000000" pitchFamily="2" charset="0"/>
+                  </a:defRPr>
+                </a:pPr>
+                <a:endParaRPr lang="en-US"/>
+              </a:p>
+            </c:txPr>
+            <c:showLegendKey val="0"/>
+            <c:showVal val="1"/>
+            <c:showCatName val="1"/>
+            <c:showSerName val="0"/>
+            <c:showPercent val="0"/>
+            <c:showBubbleSize val="0"/>
+            <c:showLeaderLines val="1"/>
+            <c:leaderLines>
+              <c:spPr>
+                <a:ln w="9525" cap="flat" cmpd="sng" algn="ctr">
+                  <a:solidFill>
+                    <a:schemeClr val="tx1">
+                      <a:lumMod val="35000"/>
+                      <a:lumOff val="65000"/>
+                    </a:schemeClr>
+                  </a:solidFill>
+                  <a:round/>
+                </a:ln>
+                <a:effectLst/>
+              </c:spPr>
+            </c:leaderLines>
+            <c:extLst>
+              <c:ext xmlns:c15="http://schemas.microsoft.com/office/drawing/2012/chart" uri="{CE6537A1-D6FC-4f65-9D91-7224C49458BB}"/>
+            </c:extLst>
+          </c:dLbls>
+          <c:cat>
+            <c:strRef>
+              <c:f>Tabelle1!$A$2:$A$5</c:f>
+              <c:strCache>
+                <c:ptCount val="4"/>
+                <c:pt idx="0">
+                  <c:v>Tabular</c:v>
+                </c:pt>
+                <c:pt idx="1">
+                  <c:v>Image</c:v>
+                </c:pt>
+                <c:pt idx="2">
+                  <c:v>Text</c:v>
+                </c:pt>
+                <c:pt idx="3">
+                  <c:v>Audio</c:v>
+                </c:pt>
+              </c:strCache>
+            </c:strRef>
+          </c:cat>
+          <c:val>
+            <c:numRef>
+              <c:f>Tabelle1!$C$2:$C$5</c:f>
+              <c:numCache>
+                <c:formatCode>General</c:formatCode>
+                <c:ptCount val="4"/>
+                <c:pt idx="0">
+                  <c:v>315</c:v>
+                </c:pt>
+                <c:pt idx="1">
+                  <c:v>151</c:v>
+                </c:pt>
+                <c:pt idx="2">
+                  <c:v>13</c:v>
+                </c:pt>
+                <c:pt idx="3">
+                  <c:v>0</c:v>
+                </c:pt>
+              </c:numCache>
+            </c:numRef>
+          </c:val>
+          <c:extLst>
+            <c:ext xmlns:c16="http://schemas.microsoft.com/office/drawing/2014/chart" uri="{C3380CC4-5D6E-409C-BE32-E72D297353CC}">
+              <c16:uniqueId val="{00000009-BC75-434D-99A1-9B096411F0F4}"/>
             </c:ext>
           </c:extLst>
         </c:ser>
@@ -709,7 +887,7 @@
 <file path=ppt/charts/chart3.xml><?xml version="1.0" encoding="utf-8"?>
 <c:chartSpace xmlns:c="http://schemas.openxmlformats.org/drawingml/2006/chart" xmlns:a="http://schemas.openxmlformats.org/drawingml/2006/main" xmlns:r="http://schemas.openxmlformats.org/officeDocument/2006/relationships" xmlns:c16r2="http://schemas.microsoft.com/office/drawing/2015/06/chart">
   <c:date1904 val="0"/>
-  <c:lang val="de-DE"/>
+  <c:lang val="en-US"/>
   <c:roundedCorners val="0"/>
   <mc:AlternateContent xmlns:mc="http://schemas.openxmlformats.org/markup-compatibility/2006">
     <mc:Choice xmlns:c14="http://schemas.microsoft.com/office/drawing/2007/8/2/chart" Requires="c14">
@@ -1016,7 +1194,7 @@
 <file path=ppt/charts/chart4.xml><?xml version="1.0" encoding="utf-8"?>
 <c:chartSpace xmlns:c="http://schemas.openxmlformats.org/drawingml/2006/chart" xmlns:a="http://schemas.openxmlformats.org/drawingml/2006/main" xmlns:r="http://schemas.openxmlformats.org/officeDocument/2006/relationships" xmlns:c16r2="http://schemas.microsoft.com/office/drawing/2015/06/chart">
   <c:date1904 val="0"/>
-  <c:lang val="de-DE"/>
+  <c:lang val="en-US"/>
   <c:roundedCorners val="0"/>
   <mc:AlternateContent xmlns:mc="http://schemas.openxmlformats.org/markup-compatibility/2006">
     <mc:Choice xmlns:c14="http://schemas.microsoft.com/office/drawing/2007/8/2/chart" Requires="c14">
@@ -7882,7 +8060,7 @@
           <a:p>
             <a:fld id="{48836E2F-4352-400F-B512-12354A0B3E94}" type="datetimeFigureOut">
               <a:rPr lang="en-US" smtClean="0"/>
-              <a:t>9/22/2022</a:t>
+              <a:t>6/20/2023</a:t>
             </a:fld>
             <a:endParaRPr lang="en-US"/>
           </a:p>
@@ -7936,7 +8114,7 @@
           <a:p>
             <a:fld id="{7B2D1A8E-A2F8-450C-B9B6-D39C93FE74DD}" type="slidenum">
               <a:rPr lang="en-US" smtClean="0"/>
-              <a:t>‹Nr.›</a:t>
+              <a:t>‹#›</a:t>
             </a:fld>
             <a:endParaRPr lang="en-US"/>
           </a:p>
@@ -8082,7 +8260,7 @@
           <a:p>
             <a:fld id="{48836E2F-4352-400F-B512-12354A0B3E94}" type="datetimeFigureOut">
               <a:rPr lang="en-US" smtClean="0"/>
-              <a:t>9/22/2022</a:t>
+              <a:t>6/20/2023</a:t>
             </a:fld>
             <a:endParaRPr lang="en-US"/>
           </a:p>
@@ -8136,7 +8314,7 @@
           <a:p>
             <a:fld id="{7B2D1A8E-A2F8-450C-B9B6-D39C93FE74DD}" type="slidenum">
               <a:rPr lang="en-US" smtClean="0"/>
-              <a:t>‹Nr.›</a:t>
+              <a:t>‹#›</a:t>
             </a:fld>
             <a:endParaRPr lang="en-US"/>
           </a:p>
@@ -8292,7 +8470,7 @@
           <a:p>
             <a:fld id="{48836E2F-4352-400F-B512-12354A0B3E94}" type="datetimeFigureOut">
               <a:rPr lang="en-US" smtClean="0"/>
-              <a:t>9/22/2022</a:t>
+              <a:t>6/20/2023</a:t>
             </a:fld>
             <a:endParaRPr lang="en-US"/>
           </a:p>
@@ -8346,7 +8524,7 @@
           <a:p>
             <a:fld id="{7B2D1A8E-A2F8-450C-B9B6-D39C93FE74DD}" type="slidenum">
               <a:rPr lang="en-US" smtClean="0"/>
-              <a:t>‹Nr.›</a:t>
+              <a:t>‹#›</a:t>
             </a:fld>
             <a:endParaRPr lang="en-US"/>
           </a:p>
@@ -8492,7 +8670,7 @@
           <a:p>
             <a:fld id="{48836E2F-4352-400F-B512-12354A0B3E94}" type="datetimeFigureOut">
               <a:rPr lang="en-US" smtClean="0"/>
-              <a:t>9/22/2022</a:t>
+              <a:t>6/20/2023</a:t>
             </a:fld>
             <a:endParaRPr lang="en-US"/>
           </a:p>
@@ -8546,7 +8724,7 @@
           <a:p>
             <a:fld id="{7B2D1A8E-A2F8-450C-B9B6-D39C93FE74DD}" type="slidenum">
               <a:rPr lang="en-US" smtClean="0"/>
-              <a:t>‹Nr.›</a:t>
+              <a:t>‹#›</a:t>
             </a:fld>
             <a:endParaRPr lang="en-US"/>
           </a:p>
@@ -8768,7 +8946,7 @@
           <a:p>
             <a:fld id="{48836E2F-4352-400F-B512-12354A0B3E94}" type="datetimeFigureOut">
               <a:rPr lang="en-US" smtClean="0"/>
-              <a:t>9/22/2022</a:t>
+              <a:t>6/20/2023</a:t>
             </a:fld>
             <a:endParaRPr lang="en-US"/>
           </a:p>
@@ -8822,7 +9000,7 @@
           <a:p>
             <a:fld id="{7B2D1A8E-A2F8-450C-B9B6-D39C93FE74DD}" type="slidenum">
               <a:rPr lang="en-US" smtClean="0"/>
-              <a:t>‹Nr.›</a:t>
+              <a:t>‹#›</a:t>
             </a:fld>
             <a:endParaRPr lang="en-US"/>
           </a:p>
@@ -9036,7 +9214,7 @@
           <a:p>
             <a:fld id="{48836E2F-4352-400F-B512-12354A0B3E94}" type="datetimeFigureOut">
               <a:rPr lang="en-US" smtClean="0"/>
-              <a:t>9/22/2022</a:t>
+              <a:t>6/20/2023</a:t>
             </a:fld>
             <a:endParaRPr lang="en-US"/>
           </a:p>
@@ -9090,7 +9268,7 @@
           <a:p>
             <a:fld id="{7B2D1A8E-A2F8-450C-B9B6-D39C93FE74DD}" type="slidenum">
               <a:rPr lang="en-US" smtClean="0"/>
-              <a:t>‹Nr.›</a:t>
+              <a:t>‹#›</a:t>
             </a:fld>
             <a:endParaRPr lang="en-US"/>
           </a:p>
@@ -9451,7 +9629,7 @@
           <a:p>
             <a:fld id="{48836E2F-4352-400F-B512-12354A0B3E94}" type="datetimeFigureOut">
               <a:rPr lang="en-US" smtClean="0"/>
-              <a:t>9/22/2022</a:t>
+              <a:t>6/20/2023</a:t>
             </a:fld>
             <a:endParaRPr lang="en-US"/>
           </a:p>
@@ -9505,7 +9683,7 @@
           <a:p>
             <a:fld id="{7B2D1A8E-A2F8-450C-B9B6-D39C93FE74DD}" type="slidenum">
               <a:rPr lang="en-US" smtClean="0"/>
-              <a:t>‹Nr.›</a:t>
+              <a:t>‹#›</a:t>
             </a:fld>
             <a:endParaRPr lang="en-US"/>
           </a:p>
@@ -9593,7 +9771,7 @@
           <a:p>
             <a:fld id="{48836E2F-4352-400F-B512-12354A0B3E94}" type="datetimeFigureOut">
               <a:rPr lang="en-US" smtClean="0"/>
-              <a:t>9/22/2022</a:t>
+              <a:t>6/20/2023</a:t>
             </a:fld>
             <a:endParaRPr lang="en-US"/>
           </a:p>
@@ -9647,7 +9825,7 @@
           <a:p>
             <a:fld id="{7B2D1A8E-A2F8-450C-B9B6-D39C93FE74DD}" type="slidenum">
               <a:rPr lang="en-US" smtClean="0"/>
-              <a:t>‹Nr.›</a:t>
+              <a:t>‹#›</a:t>
             </a:fld>
             <a:endParaRPr lang="en-US"/>
           </a:p>
@@ -9706,7 +9884,7 @@
           <a:p>
             <a:fld id="{48836E2F-4352-400F-B512-12354A0B3E94}" type="datetimeFigureOut">
               <a:rPr lang="en-US" smtClean="0"/>
-              <a:t>9/22/2022</a:t>
+              <a:t>6/20/2023</a:t>
             </a:fld>
             <a:endParaRPr lang="en-US"/>
           </a:p>
@@ -9760,7 +9938,7 @@
           <a:p>
             <a:fld id="{7B2D1A8E-A2F8-450C-B9B6-D39C93FE74DD}" type="slidenum">
               <a:rPr lang="en-US" smtClean="0"/>
-              <a:t>‹Nr.›</a:t>
+              <a:t>‹#›</a:t>
             </a:fld>
             <a:endParaRPr lang="en-US"/>
           </a:p>
@@ -10019,7 +10197,7 @@
           <a:p>
             <a:fld id="{48836E2F-4352-400F-B512-12354A0B3E94}" type="datetimeFigureOut">
               <a:rPr lang="en-US" smtClean="0"/>
-              <a:t>9/22/2022</a:t>
+              <a:t>6/20/2023</a:t>
             </a:fld>
             <a:endParaRPr lang="en-US"/>
           </a:p>
@@ -10073,7 +10251,7 @@
           <a:p>
             <a:fld id="{7B2D1A8E-A2F8-450C-B9B6-D39C93FE74DD}" type="slidenum">
               <a:rPr lang="en-US" smtClean="0"/>
-              <a:t>‹Nr.›</a:t>
+              <a:t>‹#›</a:t>
             </a:fld>
             <a:endParaRPr lang="en-US"/>
           </a:p>
@@ -10308,7 +10486,7 @@
           <a:p>
             <a:fld id="{48836E2F-4352-400F-B512-12354A0B3E94}" type="datetimeFigureOut">
               <a:rPr lang="en-US" smtClean="0"/>
-              <a:t>9/22/2022</a:t>
+              <a:t>6/20/2023</a:t>
             </a:fld>
             <a:endParaRPr lang="en-US"/>
           </a:p>
@@ -10362,7 +10540,7 @@
           <a:p>
             <a:fld id="{7B2D1A8E-A2F8-450C-B9B6-D39C93FE74DD}" type="slidenum">
               <a:rPr lang="en-US" smtClean="0"/>
-              <a:t>‹Nr.›</a:t>
+              <a:t>‹#›</a:t>
             </a:fld>
             <a:endParaRPr lang="en-US"/>
           </a:p>
@@ -10551,7 +10729,7 @@
           <a:p>
             <a:fld id="{48836E2F-4352-400F-B512-12354A0B3E94}" type="datetimeFigureOut">
               <a:rPr lang="en-US" smtClean="0"/>
-              <a:t>9/22/2022</a:t>
+              <a:t>6/20/2023</a:t>
             </a:fld>
             <a:endParaRPr lang="en-US"/>
           </a:p>
@@ -10641,7 +10819,7 @@
           <a:p>
             <a:fld id="{7B2D1A8E-A2F8-450C-B9B6-D39C93FE74DD}" type="slidenum">
               <a:rPr lang="en-US" smtClean="0"/>
-              <a:t>‹Nr.›</a:t>
+              <a:t>‹#›</a:t>
             </a:fld>
             <a:endParaRPr lang="en-US"/>
           </a:p>
@@ -10981,7 +11159,7 @@
           <p:nvPr>
             <p:extLst>
               <p:ext uri="{D42A27DB-BD31-4B8C-83A1-F6EECF244321}">
-                <p14:modId xmlns:p14="http://schemas.microsoft.com/office/powerpoint/2010/main" val="944050194"/>
+                <p14:modId xmlns:p14="http://schemas.microsoft.com/office/powerpoint/2010/main" val="3509460761"/>
               </p:ext>
             </p:extLst>
           </p:nvPr>
@@ -11241,7 +11419,7 @@
           <p:nvPr>
             <p:extLst>
               <p:ext uri="{D42A27DB-BD31-4B8C-83A1-F6EECF244321}">
-                <p14:modId xmlns:p14="http://schemas.microsoft.com/office/powerpoint/2010/main" val="3077970312"/>
+                <p14:modId xmlns:p14="http://schemas.microsoft.com/office/powerpoint/2010/main" val="1031762647"/>
               </p:ext>
             </p:extLst>
           </p:nvPr>

</xml_diff>